<commit_message>
final project part 4
</commit_message>
<xml_diff>
--- a/final/classProjectPresentation.pptx
+++ b/final/classProjectPresentation.pptx
@@ -6318,13 +6318,8 @@
           <a:p>
             <a:r>
               <a:rPr lang="en-US" dirty="0"/>
-              <a:t>The data was compiled as raw counts of data pulled from four </a:t>
-            </a:r>
-            <a:r>
-              <a:rPr lang="en-US"/>
-              <a:t>different datasets</a:t>
-            </a:r>
-            <a:endParaRPr lang="en-US" dirty="0"/>
+              <a:t>The data was compiled as raw counts of data pulled from four different datasets</a:t>
+            </a:r>
           </a:p>
           <a:p>
             <a:pPr lvl="1"/>
@@ -6349,7 +6344,7 @@
             <a:pPr lvl="1"/>
             <a:r>
               <a:rPr lang="en-US" dirty="0"/>
-              <a:t>A model that pulls out the unrelated time-series trend could allow a better apples-to-apples comparison across year</a:t>
+              <a:t>A model that pulls out the unrelated time-series trend could allow a better apples-to-apples comparison across years</a:t>
             </a:r>
           </a:p>
         </p:txBody>
@@ -6671,7 +6666,7 @@
           <a:p>
             <a:r>
               <a:rPr lang="en-US" dirty="0"/>
-              <a:t>Unbalanced Results</a:t>
+              <a:t>Unbalanced Target Variable Distribution</a:t>
             </a:r>
           </a:p>
         </p:txBody>
@@ -7116,7 +7111,7 @@
             </a:pPr>
             <a:r>
               <a:rPr lang="en-US" dirty="0"/>
-              <a:t>There are some known outliers where the data inputs are known to not be representative of safety performance</a:t>
+              <a:t>There are some outliers where the data inputs are known to not be representative of safety performance</a:t>
             </a:r>
           </a:p>
         </p:txBody>
@@ -7346,7 +7341,7 @@
           <a:p>
             <a:r>
               <a:rPr lang="en-US" dirty="0"/>
-              <a:t>These models, with the parameters that were tuned, were not adequate to accurately predict performance much better than just assuming the majority classification</a:t>
+              <a:t>These models, with the parameters used, even after tuning were not adequate to accurately predict performance much better than just assuming the majority classification</a:t>
             </a:r>
           </a:p>
           <a:p>

</xml_diff>